<commit_message>
Packet 構造体 Command 構造体を Structs.h へ移動した MainFactory.cpp / .h を Factory_Main.cpp / .h へ名前を変更した 以下のファイルを追加した Factory_Magnetic.cpp Factory_Magnetic.h Factory_Player.cpp Factory_Player.h Factory_Wall.cpp Factory_Wall.h
</commit_message>
<xml_diff>
--- a/DesignNotes.pptx
+++ b/DesignNotes.pptx
@@ -663,7 +663,7 @@
         <p:nvSpPr>
           <p:cNvPr id="13316" name="Rectangle 4"/>
           <p:cNvSpPr>
-            <a:spLocks noRot="1" noChangeArrowheads="1" noTextEdit="1"/>
+            <a:spLocks noGrp="1" noRot="1" noChangeAspect="1" noChangeArrowheads="1" noTextEdit="1"/>
           </p:cNvSpPr>
           <p:nvPr>
             <p:ph type="sldImg" idx="2"/>
@@ -23325,7 +23325,7 @@
           <a:lstStyle/>
           <a:p>
             <a:r>
-              <a:rPr lang="ja-JP" altLang="en-US">
+              <a:rPr lang="ja-JP" altLang="en-US" dirty="0">
                 <a:latin typeface="ＭＳ ゴシック" pitchFamily="49" charset="-128"/>
                 <a:ea typeface="ＭＳ ゴシック" pitchFamily="49" charset="-128"/>
               </a:rPr>
@@ -23334,54 +23334,54 @@
           </a:p>
           <a:p>
             <a:r>
-              <a:rPr lang="en-US" altLang="ja-JP">
+              <a:rPr lang="en-US" altLang="ja-JP" dirty="0">
                 <a:latin typeface="ＭＳ ゴシック" pitchFamily="49" charset="-128"/>
                 <a:ea typeface="ＭＳ ゴシック" pitchFamily="49" charset="-128"/>
               </a:rPr>
               <a:t>  </a:t>
             </a:r>
             <a:r>
-              <a:rPr lang="ja-JP" altLang="en-US">
+              <a:rPr lang="ja-JP" altLang="en-US" dirty="0">
                 <a:latin typeface="ＭＳ ゴシック" pitchFamily="49" charset="-128"/>
                 <a:ea typeface="ＭＳ ゴシック" pitchFamily="49" charset="-128"/>
               </a:rPr>
               <a:t>タイプ部は変数の</a:t>
             </a:r>
-            <a:endParaRPr lang="en-US" altLang="ja-JP">
+            <a:endParaRPr lang="en-US" altLang="ja-JP" dirty="0">
               <a:latin typeface="ＭＳ ゴシック" pitchFamily="49" charset="-128"/>
               <a:ea typeface="ＭＳ ゴシック" pitchFamily="49" charset="-128"/>
             </a:endParaRPr>
           </a:p>
           <a:p>
             <a:r>
-              <a:rPr lang="en-US" altLang="ja-JP">
+              <a:rPr lang="en-US" altLang="ja-JP" dirty="0">
                 <a:latin typeface="ＭＳ ゴシック" pitchFamily="49" charset="-128"/>
                 <a:ea typeface="ＭＳ ゴシック" pitchFamily="49" charset="-128"/>
               </a:rPr>
               <a:t>      p        	</a:t>
             </a:r>
             <a:r>
-              <a:rPr lang="ja-JP" altLang="en-US">
+              <a:rPr lang="ja-JP" altLang="en-US" dirty="0">
                 <a:latin typeface="ＭＳ ゴシック" pitchFamily="49" charset="-128"/>
                 <a:ea typeface="ＭＳ ゴシック" pitchFamily="49" charset="-128"/>
               </a:rPr>
               <a:t>ポインタ</a:t>
             </a:r>
-            <a:endParaRPr lang="en-US" altLang="ja-JP">
+            <a:endParaRPr lang="en-US" altLang="ja-JP" dirty="0">
               <a:latin typeface="ＭＳ ゴシック" pitchFamily="49" charset="-128"/>
               <a:ea typeface="ＭＳ ゴシック" pitchFamily="49" charset="-128"/>
             </a:endParaRPr>
           </a:p>
           <a:p>
             <a:r>
-              <a:rPr lang="en-US" altLang="ja-JP">
+              <a:rPr lang="en-US" altLang="ja-JP" dirty="0">
                 <a:latin typeface="ＭＳ ゴシック" pitchFamily="49" charset="-128"/>
                 <a:ea typeface="ＭＳ ゴシック" pitchFamily="49" charset="-128"/>
               </a:rPr>
               <a:t>      h        	</a:t>
             </a:r>
             <a:r>
-              <a:rPr lang="ja-JP" altLang="en-US">
+              <a:rPr lang="ja-JP" altLang="en-US" dirty="0">
                 <a:latin typeface="ＭＳ ゴシック" pitchFamily="49" charset="-128"/>
                 <a:ea typeface="ＭＳ ゴシック" pitchFamily="49" charset="-128"/>
               </a:rPr>
@@ -23390,204 +23390,267 @@
           </a:p>
           <a:p>
             <a:r>
-              <a:rPr lang="en-US" altLang="ja-JP">
+              <a:rPr lang="en-US" altLang="ja-JP" dirty="0">
                 <a:latin typeface="ＭＳ ゴシック" pitchFamily="49" charset="-128"/>
                 <a:ea typeface="ＭＳ ゴシック" pitchFamily="49" charset="-128"/>
               </a:rPr>
               <a:t>      b	</a:t>
             </a:r>
             <a:r>
-              <a:rPr lang="ja-JP" altLang="en-US">
+              <a:rPr lang="ja-JP" altLang="en-US" dirty="0">
                 <a:latin typeface="ＭＳ ゴシック" pitchFamily="49" charset="-128"/>
                 <a:ea typeface="ＭＳ ゴシック" pitchFamily="49" charset="-128"/>
               </a:rPr>
               <a:t>フラグ</a:t>
             </a:r>
             <a:r>
-              <a:rPr lang="en-US" altLang="ja-JP">
+              <a:rPr lang="en-US" altLang="ja-JP" dirty="0">
                 <a:latin typeface="ＭＳ ゴシック" pitchFamily="49" charset="-128"/>
                 <a:ea typeface="ＭＳ ゴシック" pitchFamily="49" charset="-128"/>
               </a:rPr>
               <a:t> </a:t>
             </a:r>
             <a:r>
-              <a:rPr lang="ja-JP" altLang="en-US">
+              <a:rPr lang="ja-JP" altLang="en-US" dirty="0">
                 <a:latin typeface="ＭＳ ゴシック" pitchFamily="49" charset="-128"/>
                 <a:ea typeface="ＭＳ ゴシック" pitchFamily="49" charset="-128"/>
               </a:rPr>
               <a:t>論理型</a:t>
             </a:r>
             <a:r>
-              <a:rPr lang="en-US" altLang="ja-JP">
+              <a:rPr lang="en-US" altLang="ja-JP" dirty="0">
                 <a:latin typeface="ＭＳ ゴシック" pitchFamily="49" charset="-128"/>
                 <a:ea typeface="ＭＳ ゴシック" pitchFamily="49" charset="-128"/>
               </a:rPr>
-              <a:t>( bool )</a:t>
-            </a:r>
-          </a:p>
-          <a:p>
-            <a:r>
-              <a:rPr lang="en-US" altLang="ja-JP">
+              <a:t>( </a:t>
+            </a:r>
+            <a:r>
+              <a:rPr lang="en-US" altLang="ja-JP" dirty="0" err="1">
+                <a:latin typeface="ＭＳ ゴシック" pitchFamily="49" charset="-128"/>
+                <a:ea typeface="ＭＳ ゴシック" pitchFamily="49" charset="-128"/>
+              </a:rPr>
+              <a:t>bool</a:t>
+            </a:r>
+            <a:r>
+              <a:rPr lang="en-US" altLang="ja-JP" dirty="0">
+                <a:latin typeface="ＭＳ ゴシック" pitchFamily="49" charset="-128"/>
+                <a:ea typeface="ＭＳ ゴシック" pitchFamily="49" charset="-128"/>
+              </a:rPr>
+              <a:t> )</a:t>
+            </a:r>
+          </a:p>
+          <a:p>
+            <a:r>
+              <a:rPr lang="en-US" altLang="ja-JP" dirty="0">
                 <a:latin typeface="ＭＳ ゴシック" pitchFamily="49" charset="-128"/>
                 <a:ea typeface="ＭＳ ゴシック" pitchFamily="49" charset="-128"/>
               </a:rPr>
               <a:t>      c        	8bit</a:t>
             </a:r>
             <a:r>
-              <a:rPr lang="ja-JP" altLang="en-US">
+              <a:rPr lang="ja-JP" altLang="en-US" dirty="0">
                 <a:latin typeface="ＭＳ ゴシック" pitchFamily="49" charset="-128"/>
                 <a:ea typeface="ＭＳ ゴシック" pitchFamily="49" charset="-128"/>
               </a:rPr>
               <a:t>整数型 </a:t>
             </a:r>
             <a:r>
-              <a:rPr lang="en-US" altLang="ja-JP">
+              <a:rPr lang="ja-JP" altLang="en-US" dirty="0" smtClean="0">
                 <a:latin typeface="ＭＳ ゴシック" pitchFamily="49" charset="-128"/>
                 <a:ea typeface="ＭＳ ゴシック" pitchFamily="49" charset="-128"/>
               </a:rPr>
-              <a:t>( char )</a:t>
-            </a:r>
-            <a:endParaRPr lang="ja-JP" altLang="en-US">
+              <a:t>  </a:t>
+            </a:r>
+            <a:r>
+              <a:rPr lang="en-US" altLang="ja-JP" dirty="0" smtClean="0">
+                <a:latin typeface="ＭＳ ゴシック" pitchFamily="49" charset="-128"/>
+                <a:ea typeface="ＭＳ ゴシック" pitchFamily="49" charset="-128"/>
+              </a:rPr>
+              <a:t>( </a:t>
+            </a:r>
+            <a:r>
+              <a:rPr lang="en-US" altLang="ja-JP" dirty="0">
+                <a:latin typeface="ＭＳ ゴシック" pitchFamily="49" charset="-128"/>
+                <a:ea typeface="ＭＳ ゴシック" pitchFamily="49" charset="-128"/>
+              </a:rPr>
+              <a:t>char )</a:t>
+            </a:r>
+            <a:endParaRPr lang="ja-JP" altLang="en-US" dirty="0">
               <a:latin typeface="ＭＳ ゴシック" pitchFamily="49" charset="-128"/>
               <a:ea typeface="ＭＳ ゴシック" pitchFamily="49" charset="-128"/>
             </a:endParaRPr>
           </a:p>
           <a:p>
             <a:r>
-              <a:rPr lang="en-US" altLang="ja-JP">
+              <a:rPr lang="en-US" altLang="ja-JP" dirty="0">
                 <a:latin typeface="ＭＳ ゴシック" pitchFamily="49" charset="-128"/>
                 <a:ea typeface="ＭＳ ゴシック" pitchFamily="49" charset="-128"/>
               </a:rPr>
-              <a:t>      i	16bit</a:t>
-            </a:r>
-            <a:r>
-              <a:rPr lang="ja-JP" altLang="en-US">
+              <a:t>      </a:t>
+            </a:r>
+            <a:r>
+              <a:rPr lang="en-US" altLang="ja-JP" dirty="0" err="1">
                 <a:latin typeface="ＭＳ ゴシック" pitchFamily="49" charset="-128"/>
                 <a:ea typeface="ＭＳ ゴシック" pitchFamily="49" charset="-128"/>
               </a:rPr>
-              <a:t>整数型（ </a:t>
-            </a:r>
-            <a:r>
-              <a:rPr lang="en-US" altLang="ja-JP">
+              <a:t>i</a:t>
+            </a:r>
+            <a:r>
+              <a:rPr lang="en-US" altLang="ja-JP" dirty="0">
+                <a:latin typeface="ＭＳ ゴシック" pitchFamily="49" charset="-128"/>
+                <a:ea typeface="ＭＳ ゴシック" pitchFamily="49" charset="-128"/>
+              </a:rPr>
+              <a:t>	16bit</a:t>
+            </a:r>
+            <a:r>
+              <a:rPr lang="ja-JP" altLang="en-US" dirty="0" smtClean="0">
+                <a:latin typeface="ＭＳ ゴシック" pitchFamily="49" charset="-128"/>
+                <a:ea typeface="ＭＳ ゴシック" pitchFamily="49" charset="-128"/>
+              </a:rPr>
+              <a:t>整数型 （ </a:t>
+            </a:r>
+            <a:r>
+              <a:rPr lang="en-US" altLang="ja-JP" dirty="0" err="1">
                 <a:latin typeface="ＭＳ ゴシック" pitchFamily="49" charset="-128"/>
                 <a:ea typeface="ＭＳ ゴシック" pitchFamily="49" charset="-128"/>
               </a:rPr>
               <a:t>int</a:t>
             </a:r>
             <a:r>
-              <a:rPr lang="ja-JP" altLang="en-US">
+              <a:rPr lang="ja-JP" altLang="en-US" dirty="0">
                 <a:latin typeface="ＭＳ ゴシック" pitchFamily="49" charset="-128"/>
                 <a:ea typeface="ＭＳ ゴシック" pitchFamily="49" charset="-128"/>
               </a:rPr>
               <a:t> ）</a:t>
             </a:r>
-            <a:endParaRPr lang="en-US" altLang="ja-JP">
+            <a:endParaRPr lang="en-US" altLang="ja-JP" dirty="0">
               <a:latin typeface="ＭＳ ゴシック" pitchFamily="49" charset="-128"/>
               <a:ea typeface="ＭＳ ゴシック" pitchFamily="49" charset="-128"/>
             </a:endParaRPr>
           </a:p>
           <a:p>
             <a:r>
-              <a:rPr lang="en-US" altLang="ja-JP">
+              <a:rPr lang="en-US" altLang="ja-JP" dirty="0">
                 <a:latin typeface="ＭＳ ゴシック" pitchFamily="49" charset="-128"/>
                 <a:ea typeface="ＭＳ ゴシック" pitchFamily="49" charset="-128"/>
               </a:rPr>
               <a:t>      l	32bit</a:t>
             </a:r>
             <a:r>
-              <a:rPr lang="ja-JP" altLang="en-US">
+              <a:rPr lang="ja-JP" altLang="en-US" dirty="0" smtClean="0">
                 <a:latin typeface="ＭＳ ゴシック" pitchFamily="49" charset="-128"/>
                 <a:ea typeface="ＭＳ ゴシック" pitchFamily="49" charset="-128"/>
               </a:rPr>
-              <a:t>整数型 </a:t>
-            </a:r>
-            <a:r>
-              <a:rPr lang="en-US" altLang="ja-JP">
+              <a:t>整数型  </a:t>
+            </a:r>
+            <a:r>
+              <a:rPr lang="en-US" altLang="ja-JP" dirty="0">
                 <a:latin typeface="ＭＳ ゴシック" pitchFamily="49" charset="-128"/>
                 <a:ea typeface="ＭＳ ゴシック" pitchFamily="49" charset="-128"/>
               </a:rPr>
-              <a:t>( long int )</a:t>
-            </a:r>
-          </a:p>
-          <a:p>
-            <a:r>
-              <a:rPr lang="en-US" altLang="ja-JP">
+              <a:t>( long </a:t>
+            </a:r>
+            <a:r>
+              <a:rPr lang="en-US" altLang="ja-JP" dirty="0" err="1">
+                <a:latin typeface="ＭＳ ゴシック" pitchFamily="49" charset="-128"/>
+                <a:ea typeface="ＭＳ ゴシック" pitchFamily="49" charset="-128"/>
+              </a:rPr>
+              <a:t>int</a:t>
+            </a:r>
+            <a:r>
+              <a:rPr lang="en-US" altLang="ja-JP" dirty="0">
+                <a:latin typeface="ＭＳ ゴシック" pitchFamily="49" charset="-128"/>
+                <a:ea typeface="ＭＳ ゴシック" pitchFamily="49" charset="-128"/>
+              </a:rPr>
+              <a:t> )</a:t>
+            </a:r>
+          </a:p>
+          <a:p>
+            <a:r>
+              <a:rPr lang="en-US" altLang="ja-JP" dirty="0">
                 <a:latin typeface="ＭＳ ゴシック" pitchFamily="49" charset="-128"/>
                 <a:ea typeface="ＭＳ ゴシック" pitchFamily="49" charset="-128"/>
               </a:rPr>
               <a:t>      by	</a:t>
             </a:r>
             <a:r>
-              <a:rPr lang="ja-JP" altLang="en-US">
+              <a:rPr lang="ja-JP" altLang="en-US" dirty="0" smtClean="0">
                 <a:latin typeface="ＭＳ ゴシック" pitchFamily="49" charset="-128"/>
                 <a:ea typeface="ＭＳ ゴシック" pitchFamily="49" charset="-128"/>
               </a:rPr>
-              <a:t>バイナリ型</a:t>
-            </a:r>
-            <a:r>
-              <a:rPr lang="en-US" altLang="ja-JP">
+              <a:t>バイナリ型   </a:t>
+            </a:r>
+            <a:r>
+              <a:rPr lang="en-US" altLang="ja-JP" dirty="0" smtClean="0">
                 <a:latin typeface="ＭＳ ゴシック" pitchFamily="49" charset="-128"/>
                 <a:ea typeface="ＭＳ ゴシック" pitchFamily="49" charset="-128"/>
               </a:rPr>
-              <a:t>( 8bit</a:t>
-            </a:r>
-            <a:r>
-              <a:rPr lang="ja-JP" altLang="en-US">
+              <a:t>( </a:t>
+            </a:r>
+            <a:r>
+              <a:rPr lang="en-US" altLang="ja-JP" dirty="0">
+                <a:latin typeface="ＭＳ ゴシック" pitchFamily="49" charset="-128"/>
+                <a:ea typeface="ＭＳ ゴシック" pitchFamily="49" charset="-128"/>
+              </a:rPr>
+              <a:t>8bit</a:t>
+            </a:r>
+            <a:r>
+              <a:rPr lang="ja-JP" altLang="en-US" dirty="0">
                 <a:latin typeface="ＭＳ ゴシック" pitchFamily="49" charset="-128"/>
                 <a:ea typeface="ＭＳ ゴシック" pitchFamily="49" charset="-128"/>
               </a:rPr>
               <a:t>分のフラグデータ</a:t>
             </a:r>
             <a:r>
-              <a:rPr lang="en-US" altLang="ja-JP">
+              <a:rPr lang="en-US" altLang="ja-JP" dirty="0">
                 <a:latin typeface="ＭＳ ゴシック" pitchFamily="49" charset="-128"/>
                 <a:ea typeface="ＭＳ ゴシック" pitchFamily="49" charset="-128"/>
               </a:rPr>
               <a:t>, byte )</a:t>
             </a:r>
-            <a:endParaRPr lang="ja-JP" altLang="en-US">
+            <a:endParaRPr lang="ja-JP" altLang="en-US" dirty="0">
               <a:latin typeface="ＭＳ ゴシック" pitchFamily="49" charset="-128"/>
               <a:ea typeface="ＭＳ ゴシック" pitchFamily="49" charset="-128"/>
             </a:endParaRPr>
           </a:p>
           <a:p>
             <a:r>
-              <a:rPr lang="en-US" altLang="ja-JP">
+              <a:rPr lang="en-US" altLang="ja-JP" dirty="0">
                 <a:latin typeface="ＭＳ ゴシック" pitchFamily="49" charset="-128"/>
                 <a:ea typeface="ＭＳ ゴシック" pitchFamily="49" charset="-128"/>
               </a:rPr>
               <a:t>      w	</a:t>
             </a:r>
             <a:r>
-              <a:rPr lang="ja-JP" altLang="en-US">
+              <a:rPr lang="ja-JP" altLang="en-US" dirty="0">
                 <a:latin typeface="ＭＳ ゴシック" pitchFamily="49" charset="-128"/>
                 <a:ea typeface="ＭＳ ゴシック" pitchFamily="49" charset="-128"/>
               </a:rPr>
               <a:t>ワードデータ（ </a:t>
             </a:r>
             <a:r>
-              <a:rPr lang="en-US" altLang="ja-JP">
+              <a:rPr lang="en-US" altLang="ja-JP" dirty="0">
                 <a:latin typeface="ＭＳ ゴシック" pitchFamily="49" charset="-128"/>
                 <a:ea typeface="ＭＳ ゴシック" pitchFamily="49" charset="-128"/>
               </a:rPr>
               <a:t>16bit</a:t>
             </a:r>
             <a:r>
-              <a:rPr lang="ja-JP" altLang="en-US">
+              <a:rPr lang="ja-JP" altLang="en-US" dirty="0">
                 <a:latin typeface="ＭＳ ゴシック" pitchFamily="49" charset="-128"/>
                 <a:ea typeface="ＭＳ ゴシック" pitchFamily="49" charset="-128"/>
               </a:rPr>
               <a:t>分のフラグデータ</a:t>
             </a:r>
             <a:r>
-              <a:rPr lang="en-US" altLang="ja-JP">
+              <a:rPr lang="en-US" altLang="ja-JP" dirty="0">
                 <a:latin typeface="ＭＳ ゴシック" pitchFamily="49" charset="-128"/>
                 <a:ea typeface="ＭＳ ゴシック" pitchFamily="49" charset="-128"/>
               </a:rPr>
               <a:t>, unsigned short </a:t>
             </a:r>
             <a:r>
-              <a:rPr lang="ja-JP" altLang="en-US">
+              <a:rPr lang="ja-JP" altLang="en-US" dirty="0">
                 <a:latin typeface="ＭＳ ゴシック" pitchFamily="49" charset="-128"/>
                 <a:ea typeface="ＭＳ ゴシック" pitchFamily="49" charset="-128"/>
               </a:rPr>
@@ -23596,106 +23659,134 @@
           </a:p>
           <a:p>
             <a:r>
-              <a:rPr lang="en-US" altLang="ja-JP">
+              <a:rPr lang="en-US" altLang="ja-JP" dirty="0">
                 <a:latin typeface="ＭＳ ゴシック" pitchFamily="49" charset="-128"/>
                 <a:ea typeface="ＭＳ ゴシック" pitchFamily="49" charset="-128"/>
               </a:rPr>
-              <a:t>      dw	</a:t>
-            </a:r>
-            <a:r>
-              <a:rPr lang="ja-JP" altLang="en-US">
+              <a:t>      </a:t>
+            </a:r>
+            <a:r>
+              <a:rPr lang="en-US" altLang="ja-JP" dirty="0" err="1">
+                <a:latin typeface="ＭＳ ゴシック" pitchFamily="49" charset="-128"/>
+                <a:ea typeface="ＭＳ ゴシック" pitchFamily="49" charset="-128"/>
+              </a:rPr>
+              <a:t>dw</a:t>
+            </a:r>
+            <a:r>
+              <a:rPr lang="en-US" altLang="ja-JP" dirty="0">
+                <a:latin typeface="ＭＳ ゴシック" pitchFamily="49" charset="-128"/>
+                <a:ea typeface="ＭＳ ゴシック" pitchFamily="49" charset="-128"/>
+              </a:rPr>
+              <a:t>	</a:t>
+            </a:r>
+            <a:r>
+              <a:rPr lang="ja-JP" altLang="en-US" dirty="0">
                 <a:latin typeface="ＭＳ ゴシック" pitchFamily="49" charset="-128"/>
                 <a:ea typeface="ＭＳ ゴシック" pitchFamily="49" charset="-128"/>
               </a:rPr>
               <a:t>ダブルワードデータ（ </a:t>
             </a:r>
             <a:r>
-              <a:rPr lang="en-US" altLang="ja-JP">
+              <a:rPr lang="en-US" altLang="ja-JP" dirty="0">
                 <a:latin typeface="ＭＳ ゴシック" pitchFamily="49" charset="-128"/>
                 <a:ea typeface="ＭＳ ゴシック" pitchFamily="49" charset="-128"/>
               </a:rPr>
               <a:t>32bit</a:t>
             </a:r>
             <a:r>
-              <a:rPr lang="ja-JP" altLang="en-US">
+              <a:rPr lang="ja-JP" altLang="en-US" dirty="0">
                 <a:latin typeface="ＭＳ ゴシック" pitchFamily="49" charset="-128"/>
                 <a:ea typeface="ＭＳ ゴシック" pitchFamily="49" charset="-128"/>
               </a:rPr>
               <a:t>分のフラグデータ</a:t>
             </a:r>
             <a:r>
-              <a:rPr lang="en-US" altLang="ja-JP">
+              <a:rPr lang="en-US" altLang="ja-JP" dirty="0">
                 <a:latin typeface="ＭＳ ゴシック" pitchFamily="49" charset="-128"/>
                 <a:ea typeface="ＭＳ ゴシック" pitchFamily="49" charset="-128"/>
               </a:rPr>
               <a:t>, unsigned long </a:t>
             </a:r>
             <a:r>
-              <a:rPr lang="ja-JP" altLang="en-US">
+              <a:rPr lang="ja-JP" altLang="en-US" dirty="0">
                 <a:latin typeface="ＭＳ ゴシック" pitchFamily="49" charset="-128"/>
                 <a:ea typeface="ＭＳ ゴシック" pitchFamily="49" charset="-128"/>
               </a:rPr>
               <a:t>）</a:t>
             </a:r>
-            <a:endParaRPr lang="en-US" altLang="ja-JP">
+            <a:endParaRPr lang="en-US" altLang="ja-JP" dirty="0">
               <a:latin typeface="ＭＳ ゴシック" pitchFamily="49" charset="-128"/>
               <a:ea typeface="ＭＳ ゴシック" pitchFamily="49" charset="-128"/>
             </a:endParaRPr>
           </a:p>
           <a:p>
             <a:r>
-              <a:rPr lang="en-US" altLang="ja-JP">
+              <a:rPr lang="en-US" altLang="ja-JP" dirty="0">
                 <a:latin typeface="ＭＳ ゴシック" pitchFamily="49" charset="-128"/>
                 <a:ea typeface="ＭＳ ゴシック" pitchFamily="49" charset="-128"/>
               </a:rPr>
               <a:t>      f	</a:t>
             </a:r>
             <a:r>
-              <a:rPr lang="ja-JP" altLang="en-US">
+              <a:rPr lang="ja-JP" altLang="en-US" dirty="0" smtClean="0">
                 <a:latin typeface="ＭＳ ゴシック" pitchFamily="49" charset="-128"/>
                 <a:ea typeface="ＭＳ ゴシック" pitchFamily="49" charset="-128"/>
               </a:rPr>
-              <a:t>実数型</a:t>
-            </a:r>
-            <a:r>
-              <a:rPr lang="en-US" altLang="ja-JP">
+              <a:t>実数型 </a:t>
+            </a:r>
+            <a:r>
+              <a:rPr lang="en-US" altLang="ja-JP" dirty="0" smtClean="0">
                 <a:latin typeface="ＭＳ ゴシック" pitchFamily="49" charset="-128"/>
                 <a:ea typeface="ＭＳ ゴシック" pitchFamily="49" charset="-128"/>
               </a:rPr>
-              <a:t>( float )</a:t>
-            </a:r>
-          </a:p>
-          <a:p>
-            <a:r>
-              <a:rPr lang="en-US" altLang="ja-JP">
+              <a:t>( </a:t>
+            </a:r>
+            <a:r>
+              <a:rPr lang="en-US" altLang="ja-JP" dirty="0">
+                <a:latin typeface="ＭＳ ゴシック" pitchFamily="49" charset="-128"/>
+                <a:ea typeface="ＭＳ ゴシック" pitchFamily="49" charset="-128"/>
+              </a:rPr>
+              <a:t>float )</a:t>
+            </a:r>
+          </a:p>
+          <a:p>
+            <a:r>
+              <a:rPr lang="en-US" altLang="ja-JP" dirty="0">
                 <a:latin typeface="ＭＳ ゴシック" pitchFamily="49" charset="-128"/>
                 <a:ea typeface="ＭＳ ゴシック" pitchFamily="49" charset="-128"/>
               </a:rPr>
               <a:t>      v	</a:t>
             </a:r>
             <a:r>
-              <a:rPr lang="ja-JP" altLang="en-US">
+              <a:rPr lang="ja-JP" altLang="en-US" dirty="0" smtClean="0">
                 <a:latin typeface="ＭＳ ゴシック" pitchFamily="49" charset="-128"/>
                 <a:ea typeface="ＭＳ ゴシック" pitchFamily="49" charset="-128"/>
               </a:rPr>
-              <a:t>ベクトル型</a:t>
-            </a:r>
-            <a:r>
-              <a:rPr lang="en-US" altLang="ja-JP">
+              <a:t>ベクトル型 </a:t>
+            </a:r>
+            <a:r>
+              <a:rPr lang="en-US" altLang="ja-JP" dirty="0" smtClean="0">
                 <a:latin typeface="ＭＳ ゴシック" pitchFamily="49" charset="-128"/>
                 <a:ea typeface="ＭＳ ゴシック" pitchFamily="49" charset="-128"/>
               </a:rPr>
-              <a:t>( D3DXVECTOR2 , D3DXVECTOR3 , D3DXVECTOR4 </a:t>
-            </a:r>
-            <a:r>
-              <a:rPr lang="ja-JP" altLang="en-US">
+              <a:t>( </a:t>
+            </a:r>
+            <a:r>
+              <a:rPr lang="en-US" altLang="ja-JP" dirty="0">
+                <a:latin typeface="ＭＳ ゴシック" pitchFamily="49" charset="-128"/>
+                <a:ea typeface="ＭＳ ゴシック" pitchFamily="49" charset="-128"/>
+              </a:rPr>
+              <a:t>D3DXVECTOR2 , D3DXVECTOR3 , D3DXVECTOR4 </a:t>
+            </a:r>
+            <a:r>
+              <a:rPr lang="ja-JP" altLang="en-US" dirty="0">
                 <a:latin typeface="ＭＳ ゴシック" pitchFamily="49" charset="-128"/>
                 <a:ea typeface="ＭＳ ゴシック" pitchFamily="49" charset="-128"/>
               </a:rPr>
               <a:t>等</a:t>
             </a:r>
             <a:r>
-              <a:rPr lang="en-US" altLang="ja-JP">
+              <a:rPr lang="en-US" altLang="ja-JP" dirty="0">
                 <a:latin typeface="ＭＳ ゴシック" pitchFamily="49" charset="-128"/>
                 <a:ea typeface="ＭＳ ゴシック" pitchFamily="49" charset="-128"/>
               </a:rPr>
@@ -23704,199 +23795,220 @@
           </a:p>
           <a:p>
             <a:r>
-              <a:rPr lang="en-US" altLang="ja-JP">
+              <a:rPr lang="en-US" altLang="ja-JP" dirty="0">
                 <a:latin typeface="ＭＳ ゴシック" pitchFamily="49" charset="-128"/>
                 <a:ea typeface="ＭＳ ゴシック" pitchFamily="49" charset="-128"/>
               </a:rPr>
               <a:t>      v2	</a:t>
             </a:r>
             <a:r>
-              <a:rPr lang="ja-JP" altLang="en-US">
+              <a:rPr lang="ja-JP" altLang="en-US" dirty="0">
                 <a:latin typeface="ＭＳ ゴシック" pitchFamily="49" charset="-128"/>
                 <a:ea typeface="ＭＳ ゴシック" pitchFamily="49" charset="-128"/>
               </a:rPr>
               <a:t>二次元ベクトル</a:t>
             </a:r>
             <a:r>
-              <a:rPr lang="en-US" altLang="ja-JP">
+              <a:rPr lang="en-US" altLang="ja-JP" dirty="0">
                 <a:latin typeface="ＭＳ ゴシック" pitchFamily="49" charset="-128"/>
                 <a:ea typeface="ＭＳ ゴシック" pitchFamily="49" charset="-128"/>
               </a:rPr>
               <a:t>( D3DXVECTOR2 </a:t>
             </a:r>
             <a:r>
-              <a:rPr lang="ja-JP" altLang="en-US">
+              <a:rPr lang="ja-JP" altLang="en-US" dirty="0">
                 <a:latin typeface="ＭＳ ゴシック" pitchFamily="49" charset="-128"/>
                 <a:ea typeface="ＭＳ ゴシック" pitchFamily="49" charset="-128"/>
               </a:rPr>
               <a:t>等</a:t>
             </a:r>
             <a:r>
-              <a:rPr lang="en-US" altLang="ja-JP">
+              <a:rPr lang="en-US" altLang="ja-JP" dirty="0">
                 <a:latin typeface="ＭＳ ゴシック" pitchFamily="49" charset="-128"/>
                 <a:ea typeface="ＭＳ ゴシック" pitchFamily="49" charset="-128"/>
               </a:rPr>
               <a:t> )</a:t>
             </a:r>
             <a:r>
-              <a:rPr lang="ja-JP" altLang="en-US">
+              <a:rPr lang="ja-JP" altLang="en-US" dirty="0">
                 <a:latin typeface="ＭＳ ゴシック" pitchFamily="49" charset="-128"/>
                 <a:ea typeface="ＭＳ ゴシック" pitchFamily="49" charset="-128"/>
               </a:rPr>
               <a:t>を明示的に表記</a:t>
             </a:r>
-            <a:endParaRPr lang="en-US" altLang="ja-JP">
+            <a:endParaRPr lang="en-US" altLang="ja-JP" dirty="0">
               <a:latin typeface="ＭＳ ゴシック" pitchFamily="49" charset="-128"/>
               <a:ea typeface="ＭＳ ゴシック" pitchFamily="49" charset="-128"/>
             </a:endParaRPr>
           </a:p>
           <a:p>
             <a:r>
-              <a:rPr lang="en-US" altLang="ja-JP">
+              <a:rPr lang="en-US" altLang="ja-JP" dirty="0">
                 <a:latin typeface="ＭＳ ゴシック" pitchFamily="49" charset="-128"/>
                 <a:ea typeface="ＭＳ ゴシック" pitchFamily="49" charset="-128"/>
               </a:rPr>
               <a:t>      v3	</a:t>
             </a:r>
             <a:r>
-              <a:rPr lang="ja-JP" altLang="en-US">
+              <a:rPr lang="ja-JP" altLang="en-US" dirty="0">
                 <a:latin typeface="ＭＳ ゴシック" pitchFamily="49" charset="-128"/>
                 <a:ea typeface="ＭＳ ゴシック" pitchFamily="49" charset="-128"/>
               </a:rPr>
               <a:t>三次元ベクトル</a:t>
             </a:r>
             <a:r>
-              <a:rPr lang="en-US" altLang="ja-JP">
+              <a:rPr lang="en-US" altLang="ja-JP" dirty="0">
                 <a:latin typeface="ＭＳ ゴシック" pitchFamily="49" charset="-128"/>
                 <a:ea typeface="ＭＳ ゴシック" pitchFamily="49" charset="-128"/>
               </a:rPr>
               <a:t>( D3DXVECTOR3 </a:t>
             </a:r>
             <a:r>
-              <a:rPr lang="ja-JP" altLang="en-US">
+              <a:rPr lang="ja-JP" altLang="en-US" dirty="0">
                 <a:latin typeface="ＭＳ ゴシック" pitchFamily="49" charset="-128"/>
                 <a:ea typeface="ＭＳ ゴシック" pitchFamily="49" charset="-128"/>
               </a:rPr>
               <a:t>等</a:t>
             </a:r>
             <a:r>
-              <a:rPr lang="en-US" altLang="ja-JP">
+              <a:rPr lang="en-US" altLang="ja-JP" dirty="0">
                 <a:latin typeface="ＭＳ ゴシック" pitchFamily="49" charset="-128"/>
                 <a:ea typeface="ＭＳ ゴシック" pitchFamily="49" charset="-128"/>
               </a:rPr>
               <a:t> )</a:t>
             </a:r>
             <a:r>
-              <a:rPr lang="ja-JP" altLang="en-US">
+              <a:rPr lang="ja-JP" altLang="en-US" dirty="0">
                 <a:latin typeface="ＭＳ ゴシック" pitchFamily="49" charset="-128"/>
                 <a:ea typeface="ＭＳ ゴシック" pitchFamily="49" charset="-128"/>
               </a:rPr>
               <a:t>を明示的に表記</a:t>
             </a:r>
-            <a:endParaRPr lang="en-US" altLang="ja-JP">
+            <a:endParaRPr lang="en-US" altLang="ja-JP" dirty="0">
               <a:latin typeface="ＭＳ ゴシック" pitchFamily="49" charset="-128"/>
               <a:ea typeface="ＭＳ ゴシック" pitchFamily="49" charset="-128"/>
             </a:endParaRPr>
           </a:p>
           <a:p>
             <a:r>
-              <a:rPr lang="en-US" altLang="ja-JP">
+              <a:rPr lang="en-US" altLang="ja-JP" dirty="0">
                 <a:latin typeface="ＭＳ ゴシック" pitchFamily="49" charset="-128"/>
                 <a:ea typeface="ＭＳ ゴシック" pitchFamily="49" charset="-128"/>
               </a:rPr>
               <a:t>      v4	</a:t>
             </a:r>
             <a:r>
-              <a:rPr lang="ja-JP" altLang="en-US">
+              <a:rPr lang="ja-JP" altLang="en-US" dirty="0">
                 <a:latin typeface="ＭＳ ゴシック" pitchFamily="49" charset="-128"/>
                 <a:ea typeface="ＭＳ ゴシック" pitchFamily="49" charset="-128"/>
               </a:rPr>
               <a:t>四次元ベクトル</a:t>
             </a:r>
             <a:r>
-              <a:rPr lang="en-US" altLang="ja-JP">
+              <a:rPr lang="en-US" altLang="ja-JP" dirty="0">
                 <a:latin typeface="ＭＳ ゴシック" pitchFamily="49" charset="-128"/>
                 <a:ea typeface="ＭＳ ゴシック" pitchFamily="49" charset="-128"/>
               </a:rPr>
               <a:t>( D3DXVECTOR4 </a:t>
             </a:r>
             <a:r>
-              <a:rPr lang="ja-JP" altLang="en-US">
+              <a:rPr lang="ja-JP" altLang="en-US" dirty="0">
                 <a:latin typeface="ＭＳ ゴシック" pitchFamily="49" charset="-128"/>
                 <a:ea typeface="ＭＳ ゴシック" pitchFamily="49" charset="-128"/>
               </a:rPr>
               <a:t>等</a:t>
             </a:r>
             <a:r>
-              <a:rPr lang="en-US" altLang="ja-JP">
+              <a:rPr lang="en-US" altLang="ja-JP" dirty="0">
                 <a:latin typeface="ＭＳ ゴシック" pitchFamily="49" charset="-128"/>
                 <a:ea typeface="ＭＳ ゴシック" pitchFamily="49" charset="-128"/>
               </a:rPr>
               <a:t> )</a:t>
             </a:r>
             <a:r>
-              <a:rPr lang="ja-JP" altLang="en-US">
+              <a:rPr lang="ja-JP" altLang="en-US" dirty="0">
                 <a:latin typeface="ＭＳ ゴシック" pitchFamily="49" charset="-128"/>
                 <a:ea typeface="ＭＳ ゴシック" pitchFamily="49" charset="-128"/>
               </a:rPr>
               <a:t>を明示的に表記</a:t>
             </a:r>
-            <a:endParaRPr lang="en-US" altLang="ja-JP">
+            <a:endParaRPr lang="en-US" altLang="ja-JP" dirty="0">
               <a:latin typeface="ＭＳ ゴシック" pitchFamily="49" charset="-128"/>
               <a:ea typeface="ＭＳ ゴシック" pitchFamily="49" charset="-128"/>
             </a:endParaRPr>
           </a:p>
           <a:p>
             <a:r>
-              <a:rPr lang="en-US" altLang="ja-JP">
+              <a:rPr lang="en-US" altLang="ja-JP" dirty="0">
                 <a:latin typeface="ＭＳ ゴシック" pitchFamily="49" charset="-128"/>
                 <a:ea typeface="ＭＳ ゴシック" pitchFamily="49" charset="-128"/>
               </a:rPr>
               <a:t>      m	</a:t>
             </a:r>
             <a:r>
-              <a:rPr lang="ja-JP" altLang="en-US">
+              <a:rPr lang="ja-JP" altLang="en-US" dirty="0">
                 <a:latin typeface="ＭＳ ゴシック" pitchFamily="49" charset="-128"/>
                 <a:ea typeface="ＭＳ ゴシック" pitchFamily="49" charset="-128"/>
               </a:rPr>
               <a:t>マトリックス型</a:t>
             </a:r>
-            <a:endParaRPr lang="en-US" altLang="ja-JP">
+            <a:endParaRPr lang="en-US" altLang="ja-JP" dirty="0">
               <a:latin typeface="ＭＳ ゴシック" pitchFamily="49" charset="-128"/>
               <a:ea typeface="ＭＳ ゴシック" pitchFamily="49" charset="-128"/>
             </a:endParaRPr>
           </a:p>
           <a:p>
             <a:r>
-              <a:rPr lang="en-US" altLang="ja-JP">
+              <a:rPr lang="en-US" altLang="ja-JP" dirty="0">
                 <a:latin typeface="ＭＳ ゴシック" pitchFamily="49" charset="-128"/>
                 <a:ea typeface="ＭＳ ゴシック" pitchFamily="49" charset="-128"/>
               </a:rPr>
               <a:t>      s	</a:t>
             </a:r>
             <a:r>
-              <a:rPr lang="ja-JP" altLang="en-US">
+              <a:rPr lang="ja-JP" altLang="en-US" smtClean="0">
                 <a:latin typeface="ＭＳ ゴシック" pitchFamily="49" charset="-128"/>
                 <a:ea typeface="ＭＳ ゴシック" pitchFamily="49" charset="-128"/>
               </a:rPr>
-              <a:t>文字列</a:t>
-            </a:r>
-            <a:r>
-              <a:rPr lang="en-US" altLang="ja-JP">
+              <a:t>文字列 </a:t>
+            </a:r>
+            <a:r>
+              <a:rPr lang="en-US" altLang="ja-JP" smtClean="0">
                 <a:latin typeface="ＭＳ ゴシック" pitchFamily="49" charset="-128"/>
                 <a:ea typeface="ＭＳ ゴシック" pitchFamily="49" charset="-128"/>
               </a:rPr>
-              <a:t>( string , wstring , char</a:t>
-            </a:r>
-            <a:r>
-              <a:rPr lang="ja-JP" altLang="en-US">
+              <a:t>( </a:t>
+            </a:r>
+            <a:r>
+              <a:rPr lang="en-US" altLang="ja-JP" dirty="0">
+                <a:latin typeface="ＭＳ ゴシック" pitchFamily="49" charset="-128"/>
+                <a:ea typeface="ＭＳ ゴシック" pitchFamily="49" charset="-128"/>
+              </a:rPr>
+              <a:t>string , </a:t>
+            </a:r>
+            <a:r>
+              <a:rPr lang="en-US" altLang="ja-JP" dirty="0" err="1">
+                <a:latin typeface="ＭＳ ゴシック" pitchFamily="49" charset="-128"/>
+                <a:ea typeface="ＭＳ ゴシック" pitchFamily="49" charset="-128"/>
+              </a:rPr>
+              <a:t>wstring</a:t>
+            </a:r>
+            <a:r>
+              <a:rPr lang="en-US" altLang="ja-JP" dirty="0">
+                <a:latin typeface="ＭＳ ゴシック" pitchFamily="49" charset="-128"/>
+                <a:ea typeface="ＭＳ ゴシック" pitchFamily="49" charset="-128"/>
+              </a:rPr>
+              <a:t> , char</a:t>
+            </a:r>
+            <a:r>
+              <a:rPr lang="ja-JP" altLang="en-US" dirty="0">
                 <a:latin typeface="ＭＳ ゴシック" pitchFamily="49" charset="-128"/>
                 <a:ea typeface="ＭＳ ゴシック" pitchFamily="49" charset="-128"/>
               </a:rPr>
               <a:t>* 等</a:t>
             </a:r>
             <a:r>
-              <a:rPr lang="en-US" altLang="ja-JP">
+              <a:rPr lang="en-US" altLang="ja-JP" dirty="0">
                 <a:latin typeface="ＭＳ ゴシック" pitchFamily="49" charset="-128"/>
                 <a:ea typeface="ＭＳ ゴシック" pitchFamily="49" charset="-128"/>
               </a:rPr>

</xml_diff>